<commit_message>
updated logo with slightly modifications in location
</commit_message>
<xml_diff>
--- a/src/assets/logo.pptx
+++ b/src/assets/logo.pptx
@@ -13,7 +13,7 @@
     <p:sldId id="261" r:id="rId7"/>
     <p:sldId id="262" r:id="rId8"/>
     <p:sldId id="263" r:id="rId9"/>
-    <p:sldId id="264" r:id="rId10"/>
+    <p:sldId id="265" r:id="rId10"/>
   </p:sldIdLst>
   <p:sldSz cx="12192000" cy="6858000"/>
   <p:notesSz cx="6858000" cy="9144000"/>
@@ -15409,7 +15409,13 @@
   <p:cSld>
     <p:spTree>
       <p:nvGrpSpPr>
-        <p:cNvPr id="1" name=""/>
+        <p:cNvPr id="1" name="">
+          <a:extLst>
+            <a:ext uri="{FF2B5EF4-FFF2-40B4-BE49-F238E27FC236}">
+              <a16:creationId xmlns:a16="http://schemas.microsoft.com/office/drawing/2014/main" id="{ED300C0B-F524-02A4-74D7-84EBA61EF382}"/>
+            </a:ext>
+          </a:extLst>
+        </p:cNvPr>
         <p:cNvGrpSpPr/>
         <p:nvPr/>
       </p:nvGrpSpPr>
@@ -15426,7 +15432,7 @@
           <p:cNvPr id="10" name="Rectangle 9">
             <a:extLst>
               <a:ext uri="{FF2B5EF4-FFF2-40B4-BE49-F238E27FC236}">
-                <a16:creationId xmlns:a16="http://schemas.microsoft.com/office/drawing/2014/main" id="{5D89389F-6B00-1181-69AC-2DF5D0CE6473}"/>
+                <a16:creationId xmlns:a16="http://schemas.microsoft.com/office/drawing/2014/main" id="{AA34090A-354E-6133-1F97-55A7359C904F}"/>
               </a:ext>
             </a:extLst>
           </p:cNvPr>
@@ -15475,10 +15481,10 @@
       </p:sp>
       <p:grpSp>
         <p:nvGrpSpPr>
-          <p:cNvPr id="13" name="Group 12">
-            <a:extLst>
-              <a:ext uri="{FF2B5EF4-FFF2-40B4-BE49-F238E27FC236}">
-                <a16:creationId xmlns:a16="http://schemas.microsoft.com/office/drawing/2014/main" id="{F969D5E3-FD0F-4080-9EAD-2A3F6D74CEA0}"/>
+          <p:cNvPr id="23" name="Group 22">
+            <a:extLst>
+              <a:ext uri="{FF2B5EF4-FFF2-40B4-BE49-F238E27FC236}">
+                <a16:creationId xmlns:a16="http://schemas.microsoft.com/office/drawing/2014/main" id="{2AD641E3-EB8F-1767-6ECC-A74F8F6868C4}"/>
               </a:ext>
             </a:extLst>
           </p:cNvPr>
@@ -15487,9 +15493,9 @@
         </p:nvGrpSpPr>
         <p:grpSpPr>
           <a:xfrm>
-            <a:off x="1219200" y="1600200"/>
+            <a:off x="1221283" y="1600200"/>
             <a:ext cx="3657600" cy="3657600"/>
-            <a:chOff x="1163385" y="1632284"/>
+            <a:chOff x="1221283" y="1600200"/>
             <a:chExt cx="3657600" cy="3657600"/>
           </a:xfrm>
         </p:grpSpPr>
@@ -15498,7 +15504,7 @@
             <p:cNvPr id="12" name="Oval 11">
               <a:extLst>
                 <a:ext uri="{FF2B5EF4-FFF2-40B4-BE49-F238E27FC236}">
-                  <a16:creationId xmlns:a16="http://schemas.microsoft.com/office/drawing/2014/main" id="{6E126D79-B0E0-B0D3-BB5B-F759D4CD547F}"/>
+                  <a16:creationId xmlns:a16="http://schemas.microsoft.com/office/drawing/2014/main" id="{9E5544D8-338E-ABC6-99FD-5A56B7EE754A}"/>
                 </a:ext>
               </a:extLst>
             </p:cNvPr>
@@ -15509,7 +15515,7 @@
           </p:nvSpPr>
           <p:spPr>
             <a:xfrm>
-              <a:off x="1163385" y="1632284"/>
+              <a:off x="1221283" y="1600200"/>
               <a:ext cx="3657600" cy="3657600"/>
             </a:xfrm>
             <a:prstGeom prst="ellipse">
@@ -15549,10 +15555,10 @@
         </p:sp>
         <p:grpSp>
           <p:nvGrpSpPr>
-            <p:cNvPr id="11" name="Group 10">
+            <p:cNvPr id="3" name="Group 2">
               <a:extLst>
                 <a:ext uri="{FF2B5EF4-FFF2-40B4-BE49-F238E27FC236}">
-                  <a16:creationId xmlns:a16="http://schemas.microsoft.com/office/drawing/2014/main" id="{4A9ED67B-EFAD-5BDB-7F6F-3C9E150B8A79}"/>
+                  <a16:creationId xmlns:a16="http://schemas.microsoft.com/office/drawing/2014/main" id="{54C39311-AA6E-1BC6-152B-69C37D7C59AD}"/>
                 </a:ext>
               </a:extLst>
             </p:cNvPr>
@@ -15561,18 +15567,18 @@
           </p:nvGrpSpPr>
           <p:grpSpPr>
             <a:xfrm>
-              <a:off x="1730777" y="2325221"/>
-              <a:ext cx="2522817" cy="2207558"/>
-              <a:chOff x="7024671" y="2514599"/>
-              <a:chExt cx="2522817" cy="2207558"/>
+              <a:off x="1783080" y="2295144"/>
+              <a:ext cx="2523744" cy="2205551"/>
+              <a:chOff x="1783080" y="2295144"/>
+              <a:chExt cx="2523744" cy="2205551"/>
             </a:xfrm>
           </p:grpSpPr>
           <p:grpSp>
             <p:nvGrpSpPr>
-              <p:cNvPr id="4" name="Group 3">
+              <p:cNvPr id="2" name="Group 1">
                 <a:extLst>
                   <a:ext uri="{FF2B5EF4-FFF2-40B4-BE49-F238E27FC236}">
-                    <a16:creationId xmlns:a16="http://schemas.microsoft.com/office/drawing/2014/main" id="{B86BD30E-D199-3A4D-A806-7597C5B8D62A}"/>
+                    <a16:creationId xmlns:a16="http://schemas.microsoft.com/office/drawing/2014/main" id="{4E5347BE-7C29-6F3D-E800-F907018DFCCA}"/>
                   </a:ext>
                 </a:extLst>
               </p:cNvPr>
@@ -15580,11 +15586,11 @@
               <p:nvPr/>
             </p:nvGrpSpPr>
             <p:grpSpPr>
-              <a:xfrm rot="13500000">
-                <a:off x="7371679" y="2514600"/>
-                <a:ext cx="1828801" cy="1828800"/>
-                <a:chOff x="1828799" y="3657600"/>
-                <a:chExt cx="1828801" cy="1828800"/>
+              <a:xfrm>
+                <a:off x="2130552" y="2295144"/>
+                <a:ext cx="1828800" cy="1828800"/>
+                <a:chOff x="2130552" y="2295144"/>
+                <a:chExt cx="1828800" cy="1828800"/>
               </a:xfrm>
             </p:grpSpPr>
             <p:sp>
@@ -15592,7 +15598,7 @@
                 <p:cNvPr id="5" name="Arc 4">
                   <a:extLst>
                     <a:ext uri="{FF2B5EF4-FFF2-40B4-BE49-F238E27FC236}">
-                      <a16:creationId xmlns:a16="http://schemas.microsoft.com/office/drawing/2014/main" id="{ABC9E7BE-4686-F21A-CB50-7022D5A3CE3B}"/>
+                      <a16:creationId xmlns:a16="http://schemas.microsoft.com/office/drawing/2014/main" id="{DC77B759-998B-64E9-21BB-8421AB7432B0}"/>
                     </a:ext>
                   </a:extLst>
                 </p:cNvPr>
@@ -15602,8 +15608,8 @@
                 <p:nvPr/>
               </p:nvSpPr>
               <p:spPr>
-                <a:xfrm rot="10800000">
-                  <a:off x="1828800" y="3657600"/>
+                <a:xfrm rot="2700000">
+                  <a:off x="2130552" y="2295144"/>
                   <a:ext cx="1828800" cy="1828800"/>
                 </a:xfrm>
                 <a:prstGeom prst="arc">
@@ -15658,7 +15664,7 @@
                 <p:cNvPr id="6" name="Arc 5">
                   <a:extLst>
                     <a:ext uri="{FF2B5EF4-FFF2-40B4-BE49-F238E27FC236}">
-                      <a16:creationId xmlns:a16="http://schemas.microsoft.com/office/drawing/2014/main" id="{B67D2288-D542-8BDF-697C-CFB3A1F0F949}"/>
+                      <a16:creationId xmlns:a16="http://schemas.microsoft.com/office/drawing/2014/main" id="{81D6298F-E70E-43B5-7F5C-035558B3C2B0}"/>
                     </a:ext>
                   </a:extLst>
                 </p:cNvPr>
@@ -15668,8 +15674,8 @@
                 <p:nvPr/>
               </p:nvSpPr>
               <p:spPr>
-                <a:xfrm rot="5400000">
-                  <a:off x="1828800" y="3657600"/>
+                <a:xfrm rot="18900000">
+                  <a:off x="2130552" y="2295144"/>
                   <a:ext cx="1828800" cy="1828800"/>
                 </a:xfrm>
                 <a:prstGeom prst="arc">
@@ -15721,7 +15727,7 @@
                 <p:cNvPr id="7" name="Arc 6">
                   <a:extLst>
                     <a:ext uri="{FF2B5EF4-FFF2-40B4-BE49-F238E27FC236}">
-                      <a16:creationId xmlns:a16="http://schemas.microsoft.com/office/drawing/2014/main" id="{917521A4-D91E-03AC-78B2-E6E2DF715D9F}"/>
+                      <a16:creationId xmlns:a16="http://schemas.microsoft.com/office/drawing/2014/main" id="{C91E189B-39B2-633C-23EB-3D47C6C8FC46}"/>
                     </a:ext>
                   </a:extLst>
                 </p:cNvPr>
@@ -15731,8 +15737,8 @@
                 <p:nvPr/>
               </p:nvSpPr>
               <p:spPr>
-                <a:xfrm>
-                  <a:off x="1828799" y="3657600"/>
+                <a:xfrm rot="13500000">
+                  <a:off x="2130552" y="2295144"/>
                   <a:ext cx="1828800" cy="1828800"/>
                 </a:xfrm>
                 <a:prstGeom prst="arc">
@@ -15788,7 +15794,7 @@
               <p:cNvPr id="8" name="Oval 7">
                 <a:extLst>
                   <a:ext uri="{FF2B5EF4-FFF2-40B4-BE49-F238E27FC236}">
-                    <a16:creationId xmlns:a16="http://schemas.microsoft.com/office/drawing/2014/main" id="{F5DF0EE3-AC95-E2DE-C4CA-B0149D3679A9}"/>
+                    <a16:creationId xmlns:a16="http://schemas.microsoft.com/office/drawing/2014/main" id="{9BD51C7C-CF93-5924-E690-F5BE0221704E}"/>
                   </a:ext>
                 </a:extLst>
               </p:cNvPr>
@@ -15799,7 +15805,7 @@
             </p:nvSpPr>
             <p:spPr>
               <a:xfrm>
-                <a:off x="7024671" y="3853477"/>
+                <a:off x="1783080" y="3630168"/>
                 <a:ext cx="868680" cy="868680"/>
               </a:xfrm>
               <a:prstGeom prst="ellipse">
@@ -15842,7 +15848,7 @@
               <p:cNvPr id="9" name="Oval 8">
                 <a:extLst>
                   <a:ext uri="{FF2B5EF4-FFF2-40B4-BE49-F238E27FC236}">
-                    <a16:creationId xmlns:a16="http://schemas.microsoft.com/office/drawing/2014/main" id="{245CE01A-9766-88DA-7584-EFE1CD86E35D}"/>
+                    <a16:creationId xmlns:a16="http://schemas.microsoft.com/office/drawing/2014/main" id="{B430E8C3-1B51-0ACE-51F0-5806170D3A15}"/>
                   </a:ext>
                 </a:extLst>
               </p:cNvPr>
@@ -15853,7 +15859,7 @@
             </p:nvSpPr>
             <p:spPr>
               <a:xfrm>
-                <a:off x="8678808" y="3853477"/>
+                <a:off x="3438144" y="3632015"/>
                 <a:ext cx="868680" cy="868680"/>
               </a:xfrm>
               <a:prstGeom prst="ellipse">
@@ -15887,7 +15893,7 @@
               <a:lstStyle/>
               <a:p>
                 <a:pPr algn="ctr"/>
-                <a:endParaRPr lang="en-US"/>
+                <a:endParaRPr lang="en-US" dirty="0"/>
               </a:p>
             </p:txBody>
           </p:sp>
@@ -15895,10 +15901,10 @@
       </p:grpSp>
       <p:grpSp>
         <p:nvGrpSpPr>
-          <p:cNvPr id="14" name="Group 13">
-            <a:extLst>
-              <a:ext uri="{FF2B5EF4-FFF2-40B4-BE49-F238E27FC236}">
-                <a16:creationId xmlns:a16="http://schemas.microsoft.com/office/drawing/2014/main" id="{C5B6F2ED-C4C7-EEC6-A521-08C420F71F2D}"/>
+          <p:cNvPr id="24" name="Group 23">
+            <a:extLst>
+              <a:ext uri="{FF2B5EF4-FFF2-40B4-BE49-F238E27FC236}">
+                <a16:creationId xmlns:a16="http://schemas.microsoft.com/office/drawing/2014/main" id="{78C17147-F27B-6D9E-325C-2420A2BF5E31}"/>
               </a:ext>
             </a:extLst>
           </p:cNvPr>
@@ -15909,16 +15915,16 @@
           <a:xfrm>
             <a:off x="7315200" y="1600200"/>
             <a:ext cx="3657600" cy="3657600"/>
-            <a:chOff x="1163385" y="1632284"/>
+            <a:chOff x="1219200" y="1600200"/>
             <a:chExt cx="3657600" cy="3657600"/>
           </a:xfrm>
         </p:grpSpPr>
         <p:sp>
           <p:nvSpPr>
-            <p:cNvPr id="15" name="Oval 14">
+            <p:cNvPr id="25" name="Oval 24">
               <a:extLst>
                 <a:ext uri="{FF2B5EF4-FFF2-40B4-BE49-F238E27FC236}">
-                  <a16:creationId xmlns:a16="http://schemas.microsoft.com/office/drawing/2014/main" id="{E7E9E3BB-24AC-10E6-CF79-334FC0D3716D}"/>
+                  <a16:creationId xmlns:a16="http://schemas.microsoft.com/office/drawing/2014/main" id="{90A45D43-33BC-2DEE-8AEA-DAAACCC2F45C}"/>
                 </a:ext>
               </a:extLst>
             </p:cNvPr>
@@ -15929,7 +15935,7 @@
           </p:nvSpPr>
           <p:spPr>
             <a:xfrm>
-              <a:off x="1163385" y="1632284"/>
+              <a:off x="1219200" y="1600200"/>
               <a:ext cx="3657600" cy="3657600"/>
             </a:xfrm>
             <a:prstGeom prst="ellipse">
@@ -15963,16 +15969,16 @@
             <a:lstStyle/>
             <a:p>
               <a:pPr algn="ctr"/>
-              <a:endParaRPr lang="en-US" dirty="0"/>
+              <a:endParaRPr lang="en-US"/>
             </a:p>
           </p:txBody>
         </p:sp>
         <p:grpSp>
           <p:nvGrpSpPr>
-            <p:cNvPr id="16" name="Group 15">
+            <p:cNvPr id="26" name="Group 25">
               <a:extLst>
                 <a:ext uri="{FF2B5EF4-FFF2-40B4-BE49-F238E27FC236}">
-                  <a16:creationId xmlns:a16="http://schemas.microsoft.com/office/drawing/2014/main" id="{56E398BC-155F-4541-7925-F6282FF27977}"/>
+                  <a16:creationId xmlns:a16="http://schemas.microsoft.com/office/drawing/2014/main" id="{2ADC4EF9-FFB6-79BF-7522-373A891A1767}"/>
                 </a:ext>
               </a:extLst>
             </p:cNvPr>
@@ -15981,18 +15987,18 @@
           </p:nvGrpSpPr>
           <p:grpSpPr>
             <a:xfrm>
-              <a:off x="1730777" y="2325221"/>
-              <a:ext cx="2522817" cy="2207558"/>
-              <a:chOff x="7024671" y="2514599"/>
-              <a:chExt cx="2522817" cy="2207558"/>
+              <a:off x="1783080" y="2295144"/>
+              <a:ext cx="2523744" cy="2205551"/>
+              <a:chOff x="1783080" y="2295144"/>
+              <a:chExt cx="2523744" cy="2205551"/>
             </a:xfrm>
           </p:grpSpPr>
           <p:grpSp>
             <p:nvGrpSpPr>
-              <p:cNvPr id="17" name="Group 16">
+              <p:cNvPr id="27" name="Group 26">
                 <a:extLst>
                   <a:ext uri="{FF2B5EF4-FFF2-40B4-BE49-F238E27FC236}">
-                    <a16:creationId xmlns:a16="http://schemas.microsoft.com/office/drawing/2014/main" id="{3876E326-76CA-1806-E4C3-C6518E83049B}"/>
+                    <a16:creationId xmlns:a16="http://schemas.microsoft.com/office/drawing/2014/main" id="{5FD8E20A-0248-C2CD-EE3A-6E0DB0FF8C51}"/>
                   </a:ext>
                 </a:extLst>
               </p:cNvPr>
@@ -16000,19 +16006,19 @@
               <p:nvPr/>
             </p:nvGrpSpPr>
             <p:grpSpPr>
-              <a:xfrm rot="13500000">
-                <a:off x="7371679" y="2514600"/>
-                <a:ext cx="1828801" cy="1828800"/>
-                <a:chOff x="1828799" y="3657600"/>
-                <a:chExt cx="1828801" cy="1828800"/>
+              <a:xfrm>
+                <a:off x="2130552" y="2295144"/>
+                <a:ext cx="1828800" cy="1828800"/>
+                <a:chOff x="2130552" y="2295144"/>
+                <a:chExt cx="1828800" cy="1828800"/>
               </a:xfrm>
             </p:grpSpPr>
             <p:sp>
               <p:nvSpPr>
-                <p:cNvPr id="20" name="Arc 19">
+                <p:cNvPr id="30" name="Arc 29">
                   <a:extLst>
                     <a:ext uri="{FF2B5EF4-FFF2-40B4-BE49-F238E27FC236}">
-                      <a16:creationId xmlns:a16="http://schemas.microsoft.com/office/drawing/2014/main" id="{5876F3ED-DA6A-FF9D-E5F7-8250DC409D87}"/>
+                      <a16:creationId xmlns:a16="http://schemas.microsoft.com/office/drawing/2014/main" id="{D2981B29-ADD5-8E00-D152-B80B5D576F3D}"/>
                     </a:ext>
                   </a:extLst>
                 </p:cNvPr>
@@ -16022,8 +16028,8 @@
                 <p:nvPr/>
               </p:nvSpPr>
               <p:spPr>
-                <a:xfrm rot="10800000">
-                  <a:off x="1828800" y="3657600"/>
+                <a:xfrm rot="2700000">
+                  <a:off x="2130552" y="2295144"/>
                   <a:ext cx="1828800" cy="1828800"/>
                 </a:xfrm>
                 <a:prstGeom prst="arc">
@@ -16075,10 +16081,10 @@
             </p:sp>
             <p:sp>
               <p:nvSpPr>
-                <p:cNvPr id="21" name="Arc 20">
+                <p:cNvPr id="31" name="Arc 30">
                   <a:extLst>
                     <a:ext uri="{FF2B5EF4-FFF2-40B4-BE49-F238E27FC236}">
-                      <a16:creationId xmlns:a16="http://schemas.microsoft.com/office/drawing/2014/main" id="{30701F77-569D-5BDE-C30C-E1129D4E1C96}"/>
+                      <a16:creationId xmlns:a16="http://schemas.microsoft.com/office/drawing/2014/main" id="{9D5FA16E-C515-D5C8-4965-70B00D8EC780}"/>
                     </a:ext>
                   </a:extLst>
                 </p:cNvPr>
@@ -16088,8 +16094,8 @@
                 <p:nvPr/>
               </p:nvSpPr>
               <p:spPr>
-                <a:xfrm rot="5400000">
-                  <a:off x="1828800" y="3657600"/>
+                <a:xfrm rot="18900000">
+                  <a:off x="2130552" y="2295144"/>
                   <a:ext cx="1828800" cy="1828800"/>
                 </a:xfrm>
                 <a:prstGeom prst="arc">
@@ -16138,10 +16144,10 @@
             </p:sp>
             <p:sp>
               <p:nvSpPr>
-                <p:cNvPr id="22" name="Arc 21">
+                <p:cNvPr id="32" name="Arc 31">
                   <a:extLst>
                     <a:ext uri="{FF2B5EF4-FFF2-40B4-BE49-F238E27FC236}">
-                      <a16:creationId xmlns:a16="http://schemas.microsoft.com/office/drawing/2014/main" id="{44E43FF0-A37C-A537-99D1-B326A0195EC9}"/>
+                      <a16:creationId xmlns:a16="http://schemas.microsoft.com/office/drawing/2014/main" id="{A3A5E670-903B-1B0E-C6CA-527B68A27940}"/>
                     </a:ext>
                   </a:extLst>
                 </p:cNvPr>
@@ -16151,8 +16157,8 @@
                 <p:nvPr/>
               </p:nvSpPr>
               <p:spPr>
-                <a:xfrm>
-                  <a:off x="1828799" y="3657600"/>
+                <a:xfrm rot="13500000">
+                  <a:off x="2130552" y="2295144"/>
                   <a:ext cx="1828800" cy="1828800"/>
                 </a:xfrm>
                 <a:prstGeom prst="arc">
@@ -16205,10 +16211,10 @@
           </p:grpSp>
           <p:sp>
             <p:nvSpPr>
-              <p:cNvPr id="18" name="Oval 17">
+              <p:cNvPr id="28" name="Oval 27">
                 <a:extLst>
                   <a:ext uri="{FF2B5EF4-FFF2-40B4-BE49-F238E27FC236}">
-                    <a16:creationId xmlns:a16="http://schemas.microsoft.com/office/drawing/2014/main" id="{BC7F203E-6334-E8D7-4C0E-8B7584137D74}"/>
+                    <a16:creationId xmlns:a16="http://schemas.microsoft.com/office/drawing/2014/main" id="{2CAC2E54-C88A-CCFC-D11F-3E52A4322BE9}"/>
                   </a:ext>
                 </a:extLst>
               </p:cNvPr>
@@ -16219,7 +16225,7 @@
             </p:nvSpPr>
             <p:spPr>
               <a:xfrm>
-                <a:off x="7024671" y="3853477"/>
+                <a:off x="1783080" y="3630168"/>
                 <a:ext cx="868680" cy="868680"/>
               </a:xfrm>
               <a:prstGeom prst="ellipse">
@@ -16259,10 +16265,10 @@
           </p:sp>
           <p:sp>
             <p:nvSpPr>
-              <p:cNvPr id="19" name="Oval 18">
+              <p:cNvPr id="29" name="Oval 28">
                 <a:extLst>
                   <a:ext uri="{FF2B5EF4-FFF2-40B4-BE49-F238E27FC236}">
-                    <a16:creationId xmlns:a16="http://schemas.microsoft.com/office/drawing/2014/main" id="{F463BA77-498C-44FC-61D6-392245F7282F}"/>
+                    <a16:creationId xmlns:a16="http://schemas.microsoft.com/office/drawing/2014/main" id="{63F7392A-6C6A-EEA6-B697-74CFEAAC8E52}"/>
                   </a:ext>
                 </a:extLst>
               </p:cNvPr>
@@ -16273,7 +16279,7 @@
             </p:nvSpPr>
             <p:spPr>
               <a:xfrm>
-                <a:off x="8678808" y="3853477"/>
+                <a:off x="3438144" y="3632015"/>
                 <a:ext cx="868680" cy="868680"/>
               </a:xfrm>
               <a:prstGeom prst="ellipse">
@@ -16307,7 +16313,7 @@
               <a:lstStyle/>
               <a:p>
                 <a:pPr algn="ctr"/>
-                <a:endParaRPr lang="en-US"/>
+                <a:endParaRPr lang="en-US" dirty="0"/>
               </a:p>
             </p:txBody>
           </p:sp>
@@ -16316,7 +16322,7 @@
     </p:spTree>
     <p:extLst>
       <p:ext uri="{BB962C8B-B14F-4D97-AF65-F5344CB8AC3E}">
-        <p14:creationId xmlns:p14="http://schemas.microsoft.com/office/powerpoint/2010/main" val="2720947360"/>
+        <p14:creationId xmlns:p14="http://schemas.microsoft.com/office/powerpoint/2010/main" val="15937957"/>
       </p:ext>
     </p:extLst>
   </p:cSld>

</xml_diff>